<commit_message>
change the structure in the PPT
</commit_message>
<xml_diff>
--- a/Data Structure Visualization.pptx
+++ b/Data Structure Visualization.pptx
@@ -127,7 +127,7 @@
             <a:srgbClr val="A4A3A4"/>
           </p15:clr>
         </p15:guide>
-        <p15:guide id="3" orient="horz" pos="912" userDrawn="1">
+        <p15:guide id="3" orient="horz" pos="3840" userDrawn="1">
           <p15:clr>
             <a:srgbClr val="A4A3A4"/>
           </p15:clr>
@@ -376,7 +376,7 @@
           <a:p>
             <a:fld id="{CE137251-7695-47FE-A246-603BCB21AF0C}" type="datetimeFigureOut">
               <a:rPr lang="zh-TW" altLang="en-US" smtClean="0"/>
-              <a:t>2025/12/11</a:t>
+              <a:t>2025/12/19</a:t>
             </a:fld>
             <a:endParaRPr lang="zh-TW" altLang="en-US"/>
           </a:p>
@@ -546,7 +546,7 @@
           <a:p>
             <a:fld id="{CE137251-7695-47FE-A246-603BCB21AF0C}" type="datetimeFigureOut">
               <a:rPr lang="zh-TW" altLang="en-US" smtClean="0"/>
-              <a:t>2025/12/11</a:t>
+              <a:t>2025/12/19</a:t>
             </a:fld>
             <a:endParaRPr lang="zh-TW" altLang="en-US"/>
           </a:p>
@@ -726,7 +726,7 @@
           <a:p>
             <a:fld id="{CE137251-7695-47FE-A246-603BCB21AF0C}" type="datetimeFigureOut">
               <a:rPr lang="zh-TW" altLang="en-US" smtClean="0"/>
-              <a:t>2025/12/11</a:t>
+              <a:t>2025/12/19</a:t>
             </a:fld>
             <a:endParaRPr lang="zh-TW" altLang="en-US"/>
           </a:p>
@@ -896,7 +896,7 @@
           <a:p>
             <a:fld id="{CE137251-7695-47FE-A246-603BCB21AF0C}" type="datetimeFigureOut">
               <a:rPr lang="zh-TW" altLang="en-US" smtClean="0"/>
-              <a:t>2025/12/11</a:t>
+              <a:t>2025/12/19</a:t>
             </a:fld>
             <a:endParaRPr lang="zh-TW" altLang="en-US"/>
           </a:p>
@@ -1154,7 +1154,7 @@
           <a:p>
             <a:fld id="{CE137251-7695-47FE-A246-603BCB21AF0C}" type="datetimeFigureOut">
               <a:rPr lang="zh-TW" altLang="en-US" smtClean="0"/>
-              <a:t>2025/12/11</a:t>
+              <a:t>2025/12/19</a:t>
             </a:fld>
             <a:endParaRPr lang="zh-TW" altLang="en-US"/>
           </a:p>
@@ -1442,7 +1442,7 @@
           <a:p>
             <a:fld id="{CE137251-7695-47FE-A246-603BCB21AF0C}" type="datetimeFigureOut">
               <a:rPr lang="zh-TW" altLang="en-US" smtClean="0"/>
-              <a:t>2025/12/11</a:t>
+              <a:t>2025/12/19</a:t>
             </a:fld>
             <a:endParaRPr lang="zh-TW" altLang="en-US"/>
           </a:p>
@@ -1884,7 +1884,7 @@
           <a:p>
             <a:fld id="{CE137251-7695-47FE-A246-603BCB21AF0C}" type="datetimeFigureOut">
               <a:rPr lang="zh-TW" altLang="en-US" smtClean="0"/>
-              <a:t>2025/12/11</a:t>
+              <a:t>2025/12/19</a:t>
             </a:fld>
             <a:endParaRPr lang="zh-TW" altLang="en-US"/>
           </a:p>
@@ -2002,7 +2002,7 @@
           <a:p>
             <a:fld id="{CE137251-7695-47FE-A246-603BCB21AF0C}" type="datetimeFigureOut">
               <a:rPr lang="zh-TW" altLang="en-US" smtClean="0"/>
-              <a:t>2025/12/11</a:t>
+              <a:t>2025/12/19</a:t>
             </a:fld>
             <a:endParaRPr lang="zh-TW" altLang="en-US"/>
           </a:p>
@@ -2097,7 +2097,7 @@
           <a:p>
             <a:fld id="{CE137251-7695-47FE-A246-603BCB21AF0C}" type="datetimeFigureOut">
               <a:rPr lang="zh-TW" altLang="en-US" smtClean="0"/>
-              <a:t>2025/12/11</a:t>
+              <a:t>2025/12/19</a:t>
             </a:fld>
             <a:endParaRPr lang="zh-TW" altLang="en-US"/>
           </a:p>
@@ -2385,7 +2385,7 @@
           <a:p>
             <a:fld id="{CE137251-7695-47FE-A246-603BCB21AF0C}" type="datetimeFigureOut">
               <a:rPr lang="zh-TW" altLang="en-US" smtClean="0"/>
-              <a:t>2025/12/11</a:t>
+              <a:t>2025/12/19</a:t>
             </a:fld>
             <a:endParaRPr lang="zh-TW" altLang="en-US"/>
           </a:p>
@@ -2658,7 +2658,7 @@
           <a:p>
             <a:fld id="{CE137251-7695-47FE-A246-603BCB21AF0C}" type="datetimeFigureOut">
               <a:rPr lang="zh-TW" altLang="en-US" smtClean="0"/>
-              <a:t>2025/12/11</a:t>
+              <a:t>2025/12/19</a:t>
             </a:fld>
             <a:endParaRPr lang="zh-TW" altLang="en-US"/>
           </a:p>
@@ -2969,7 +2969,7 @@
           <a:p>
             <a:fld id="{CE137251-7695-47FE-A246-603BCB21AF0C}" type="datetimeFigureOut">
               <a:rPr lang="zh-TW" altLang="en-US" smtClean="0"/>
-              <a:t>2025/12/11</a:t>
+              <a:t>2025/12/19</a:t>
             </a:fld>
             <a:endParaRPr lang="zh-TW" altLang="en-US"/>
           </a:p>
@@ -12015,8 +12015,8 @@
         </p:nvSpPr>
         <p:spPr>
           <a:xfrm>
-            <a:off x="4410075" y="523875"/>
-            <a:ext cx="4238625" cy="5962649"/>
+            <a:off x="4474729" y="549079"/>
+            <a:ext cx="4290580" cy="5867689"/>
           </a:xfrm>
           <a:prstGeom prst="rect">
             <a:avLst/>
@@ -12276,7 +12276,7 @@
               <a:buNone/>
             </a:pPr>
             <a:r>
-              <a:rPr lang="en-US" altLang="zh-TW" sz="1250" b="1" dirty="0">
+              <a:rPr lang="en-US" altLang="zh-TW" sz="1100" b="1" dirty="0">
                 <a:solidFill>
                   <a:schemeClr val="tx1">
                     <a:lumMod val="75000"/>
@@ -12287,7 +12287,7 @@
               <a:t>Data structure</a:t>
             </a:r>
             <a:r>
-              <a:rPr lang="en-US" altLang="zh-TW" sz="1250" dirty="0">
+              <a:rPr lang="en-US" altLang="zh-TW" sz="1100" dirty="0">
                 <a:solidFill>
                   <a:schemeClr val="tx1">
                     <a:lumMod val="75000"/>
@@ -12306,7 +12306,7 @@
               <a:buNone/>
             </a:pPr>
             <a:r>
-              <a:rPr lang="en-US" altLang="zh-TW" sz="1250" dirty="0">
+              <a:rPr lang="en-US" altLang="zh-TW" sz="1100" dirty="0">
                 <a:solidFill>
                   <a:schemeClr val="tx1">
                     <a:lumMod val="75000"/>
@@ -12325,7 +12325,7 @@
               <a:buNone/>
             </a:pPr>
             <a:r>
-              <a:rPr lang="en-US" altLang="zh-TW" sz="1250" dirty="0">
+              <a:rPr lang="en-US" altLang="zh-TW" sz="1100" dirty="0">
                 <a:solidFill>
                   <a:schemeClr val="tx1">
                     <a:lumMod val="75000"/>
@@ -12336,7 +12336,7 @@
               <a:t>│            ├── </a:t>
             </a:r>
             <a:r>
-              <a:rPr lang="en-US" altLang="zh-TW" sz="1250" dirty="0" err="1">
+              <a:rPr lang="en-US" altLang="zh-TW" sz="1100" dirty="0" err="1">
                 <a:solidFill>
                   <a:schemeClr val="tx1">
                     <a:lumMod val="75000"/>
@@ -12347,7 +12347,7 @@
               <a:t>css</a:t>
             </a:r>
             <a:r>
-              <a:rPr lang="en-US" altLang="zh-TW" sz="1250" dirty="0">
+              <a:rPr lang="en-US" altLang="zh-TW" sz="1100" dirty="0">
                 <a:solidFill>
                   <a:schemeClr val="tx1">
                     <a:lumMod val="75000"/>
@@ -12366,7 +12366,7 @@
               <a:buNone/>
             </a:pPr>
             <a:r>
-              <a:rPr lang="en-US" altLang="zh-TW" sz="1250" dirty="0">
+              <a:rPr lang="en-US" altLang="zh-TW" sz="1100" dirty="0">
                 <a:solidFill>
                   <a:schemeClr val="tx1">
                     <a:lumMod val="75000"/>
@@ -12385,7 +12385,7 @@
               <a:buNone/>
             </a:pPr>
             <a:r>
-              <a:rPr lang="en-US" altLang="zh-TW" sz="1250" dirty="0">
+              <a:rPr lang="en-US" altLang="zh-TW" sz="1100" dirty="0">
                 <a:solidFill>
                   <a:schemeClr val="tx1">
                     <a:lumMod val="75000"/>
@@ -12404,7 +12404,7 @@
               <a:buNone/>
             </a:pPr>
             <a:r>
-              <a:rPr lang="en-US" altLang="zh-TW" sz="1250" dirty="0">
+              <a:rPr lang="en-US" altLang="zh-TW" sz="1100" dirty="0">
                 <a:solidFill>
                   <a:schemeClr val="tx1">
                     <a:lumMod val="75000"/>
@@ -12423,7 +12423,7 @@
               <a:buNone/>
             </a:pPr>
             <a:r>
-              <a:rPr lang="en-US" altLang="zh-TW" sz="1250" dirty="0">
+              <a:rPr lang="en-US" altLang="zh-TW" sz="1100" dirty="0">
                 <a:solidFill>
                   <a:schemeClr val="tx1">
                     <a:lumMod val="75000"/>
@@ -12442,7 +12442,7 @@
               <a:buNone/>
             </a:pPr>
             <a:r>
-              <a:rPr lang="en-US" altLang="zh-TW" sz="1250" dirty="0">
+              <a:rPr lang="en-US" altLang="zh-TW" sz="1100" dirty="0">
                 <a:solidFill>
                   <a:schemeClr val="tx1">
                     <a:lumMod val="75000"/>
@@ -12453,7 +12453,7 @@
               <a:t>│            └── </a:t>
             </a:r>
             <a:r>
-              <a:rPr lang="en-US" altLang="zh-TW" sz="1250" dirty="0" err="1">
+              <a:rPr lang="en-US" altLang="zh-TW" sz="1100" dirty="0" err="1">
                 <a:solidFill>
                   <a:schemeClr val="tx1">
                     <a:lumMod val="75000"/>
@@ -12464,7 +12464,7 @@
               <a:t>js</a:t>
             </a:r>
             <a:r>
-              <a:rPr lang="en-US" altLang="zh-TW" sz="1250" dirty="0">
+              <a:rPr lang="en-US" altLang="zh-TW" sz="1100" dirty="0">
                 <a:solidFill>
                   <a:schemeClr val="tx1">
                     <a:lumMod val="75000"/>
@@ -12483,7 +12483,7 @@
               <a:buNone/>
             </a:pPr>
             <a:r>
-              <a:rPr lang="en-US" altLang="zh-TW" sz="1250" dirty="0">
+              <a:rPr lang="en-US" altLang="zh-TW" sz="1100" dirty="0">
                 <a:solidFill>
                   <a:schemeClr val="tx1">
                     <a:lumMod val="75000"/>
@@ -12502,7 +12502,7 @@
               <a:buNone/>
             </a:pPr>
             <a:r>
-              <a:rPr lang="en-US" altLang="zh-TW" sz="1250" dirty="0">
+              <a:rPr lang="en-US" altLang="zh-TW" sz="1100" dirty="0">
                 <a:solidFill>
                   <a:schemeClr val="tx1">
                     <a:lumMod val="75000"/>
@@ -12521,7 +12521,7 @@
               <a:buNone/>
             </a:pPr>
             <a:r>
-              <a:rPr lang="en-US" altLang="zh-TW" sz="1250" dirty="0">
+              <a:rPr lang="en-US" altLang="zh-TW" sz="1100" dirty="0">
                 <a:solidFill>
                   <a:schemeClr val="tx1">
                     <a:lumMod val="75000"/>
@@ -12540,7 +12540,7 @@
               <a:buNone/>
             </a:pPr>
             <a:r>
-              <a:rPr lang="en-US" altLang="zh-TW" sz="1250" dirty="0">
+              <a:rPr lang="en-US" altLang="zh-TW" sz="1100" dirty="0">
                 <a:solidFill>
                   <a:schemeClr val="tx1">
                     <a:lumMod val="75000"/>
@@ -12559,7 +12559,7 @@
               <a:buNone/>
             </a:pPr>
             <a:r>
-              <a:rPr lang="en-US" altLang="zh-TW" sz="1250" dirty="0">
+              <a:rPr lang="en-US" altLang="zh-TW" sz="1100" dirty="0">
                 <a:solidFill>
                   <a:schemeClr val="tx1">
                     <a:lumMod val="75000"/>
@@ -12578,7 +12578,7 @@
               <a:buNone/>
             </a:pPr>
             <a:r>
-              <a:rPr lang="en-US" altLang="zh-TW" sz="1250" dirty="0">
+              <a:rPr lang="en-US" altLang="zh-TW" sz="1100" dirty="0">
                 <a:solidFill>
                   <a:schemeClr val="tx1">
                     <a:lumMod val="75000"/>
@@ -12597,7 +12597,7 @@
               <a:buNone/>
             </a:pPr>
             <a:r>
-              <a:rPr lang="en-US" altLang="zh-TW" sz="1250" dirty="0">
+              <a:rPr lang="en-US" altLang="zh-TW" sz="1100" dirty="0">
                 <a:solidFill>
                   <a:schemeClr val="tx1">
                     <a:lumMod val="75000"/>
@@ -12616,7 +12616,7 @@
               <a:buNone/>
             </a:pPr>
             <a:r>
-              <a:rPr lang="en-US" altLang="zh-TW" sz="1250" dirty="0">
+              <a:rPr lang="en-US" altLang="zh-TW" sz="1100" dirty="0">
                 <a:solidFill>
                   <a:schemeClr val="tx1">
                     <a:lumMod val="75000"/>
@@ -12635,7 +12635,7 @@
               <a:buNone/>
             </a:pPr>
             <a:r>
-              <a:rPr lang="en-US" altLang="zh-TW" sz="1250" dirty="0">
+              <a:rPr lang="en-US" altLang="zh-TW" sz="1100" dirty="0">
                 <a:solidFill>
                   <a:schemeClr val="tx1">
                     <a:lumMod val="75000"/>
@@ -12654,7 +12654,7 @@
               <a:buNone/>
             </a:pPr>
             <a:r>
-              <a:rPr lang="en-US" altLang="zh-TW" sz="1250" dirty="0">
+              <a:rPr lang="en-US" altLang="zh-TW" sz="1100" dirty="0">
                 <a:solidFill>
                   <a:schemeClr val="tx1">
                     <a:lumMod val="75000"/>
@@ -12673,7 +12673,7 @@
               <a:buNone/>
             </a:pPr>
             <a:r>
-              <a:rPr lang="en-US" altLang="zh-TW" sz="1250" dirty="0">
+              <a:rPr lang="en-US" altLang="zh-TW" sz="1100" dirty="0">
                 <a:solidFill>
                   <a:schemeClr val="tx1">
                     <a:lumMod val="75000"/>
@@ -12692,7 +12692,7 @@
               <a:buNone/>
             </a:pPr>
             <a:r>
-              <a:rPr lang="en-US" altLang="zh-TW" sz="1250" dirty="0">
+              <a:rPr lang="en-US" altLang="zh-TW" sz="1100" dirty="0">
                 <a:solidFill>
                   <a:schemeClr val="tx1">
                     <a:lumMod val="75000"/>
@@ -12711,7 +12711,7 @@
               <a:buNone/>
             </a:pPr>
             <a:r>
-              <a:rPr lang="en-US" altLang="zh-TW" sz="1250" dirty="0">
+              <a:rPr lang="en-US" altLang="zh-TW" sz="1100" dirty="0">
                 <a:solidFill>
                   <a:schemeClr val="tx1">
                     <a:lumMod val="75000"/>
@@ -12730,7 +12730,7 @@
               <a:buNone/>
             </a:pPr>
             <a:r>
-              <a:rPr lang="en-US" altLang="zh-TW" sz="1250" dirty="0">
+              <a:rPr lang="en-US" altLang="zh-TW" sz="1100" dirty="0">
                 <a:solidFill>
                   <a:schemeClr val="tx1">
                     <a:lumMod val="75000"/>
@@ -12749,7 +12749,7 @@
               <a:buNone/>
             </a:pPr>
             <a:r>
-              <a:rPr lang="en-US" altLang="zh-TW" sz="1250" dirty="0">
+              <a:rPr lang="en-US" altLang="zh-TW" sz="1100" dirty="0">
                 <a:solidFill>
                   <a:schemeClr val="tx1">
                     <a:lumMod val="75000"/>
@@ -12768,7 +12768,7 @@
               <a:buNone/>
             </a:pPr>
             <a:r>
-              <a:rPr lang="en-US" altLang="zh-TW" sz="1250" dirty="0">
+              <a:rPr lang="en-US" altLang="zh-TW" sz="1100" dirty="0">
                 <a:solidFill>
                   <a:schemeClr val="tx1">
                     <a:lumMod val="75000"/>
@@ -12787,7 +12787,7 @@
               <a:buNone/>
             </a:pPr>
             <a:r>
-              <a:rPr lang="en-US" altLang="zh-TW" sz="1250" dirty="0">
+              <a:rPr lang="en-US" altLang="zh-TW" sz="1100" dirty="0">
                 <a:solidFill>
                   <a:schemeClr val="tx1">
                     <a:lumMod val="75000"/>
@@ -12806,7 +12806,7 @@
               <a:buNone/>
             </a:pPr>
             <a:r>
-              <a:rPr lang="en-US" altLang="zh-TW" sz="1250" dirty="0">
+              <a:rPr lang="en-US" altLang="zh-TW" sz="1100" dirty="0">
                 <a:solidFill>
                   <a:schemeClr val="tx1">
                     <a:lumMod val="75000"/>
@@ -12825,7 +12825,7 @@
               <a:buNone/>
             </a:pPr>
             <a:r>
-              <a:rPr lang="en-US" altLang="zh-TW" sz="1250" dirty="0">
+              <a:rPr lang="en-US" altLang="zh-TW" sz="1100" dirty="0">
                 <a:solidFill>
                   <a:schemeClr val="tx1">
                     <a:lumMod val="75000"/>
@@ -12844,7 +12844,7 @@
               <a:buNone/>
             </a:pPr>
             <a:r>
-              <a:rPr lang="en-US" altLang="zh-TW" sz="1250" dirty="0">
+              <a:rPr lang="en-US" altLang="zh-TW" sz="1100" dirty="0">
                 <a:solidFill>
                   <a:schemeClr val="tx1">
                     <a:lumMod val="75000"/>
@@ -12852,7 +12852,7 @@
                   </a:schemeClr>
                 </a:solidFill>
               </a:rPr>
-              <a:t>├── pages/</a:t>
+              <a:t>├── basic/</a:t>
             </a:r>
           </a:p>
           <a:p>
@@ -12863,7 +12863,7 @@
               <a:buNone/>
             </a:pPr>
             <a:r>
-              <a:rPr lang="en-US" altLang="zh-TW" sz="1250" dirty="0">
+              <a:rPr lang="en-US" altLang="zh-TW" sz="1100" dirty="0">
                 <a:solidFill>
                   <a:schemeClr val="tx1">
                     <a:lumMod val="75000"/>
@@ -12871,7 +12871,7 @@
                   </a:schemeClr>
                 </a:solidFill>
               </a:rPr>
-              <a:t>│            ├── basic.html</a:t>
+              <a:t>│            └── index.html</a:t>
             </a:r>
           </a:p>
           <a:p>
@@ -12882,7 +12882,7 @@
               <a:buNone/>
             </a:pPr>
             <a:r>
-              <a:rPr lang="en-US" altLang="zh-TW" sz="1250" dirty="0">
+              <a:rPr lang="en-US" altLang="zh-TW" sz="1100" dirty="0">
                 <a:solidFill>
                   <a:schemeClr val="tx1">
                     <a:lumMod val="75000"/>
@@ -12890,7 +12890,7 @@
                   </a:schemeClr>
                 </a:solidFill>
               </a:rPr>
-              <a:t>│            ├── searching.html</a:t>
+              <a:t>├── searching/</a:t>
             </a:r>
           </a:p>
           <a:p>
@@ -12901,7 +12901,7 @@
               <a:buNone/>
             </a:pPr>
             <a:r>
-              <a:rPr lang="en-US" altLang="zh-TW" sz="1250" dirty="0">
+              <a:rPr lang="en-US" altLang="zh-TW" sz="1100" dirty="0">
                 <a:solidFill>
                   <a:schemeClr val="tx1">
                     <a:lumMod val="75000"/>
@@ -12909,7 +12909,7 @@
                   </a:schemeClr>
                 </a:solidFill>
               </a:rPr>
-              <a:t>│            ├── sorting.html</a:t>
+              <a:t>│            └── index.html</a:t>
             </a:r>
           </a:p>
           <a:p>
@@ -12920,7 +12920,7 @@
               <a:buNone/>
             </a:pPr>
             <a:r>
-              <a:rPr lang="en-US" altLang="zh-TW" sz="1250" dirty="0">
+              <a:rPr lang="en-US" altLang="zh-TW" sz="1100" dirty="0">
                 <a:solidFill>
                   <a:schemeClr val="tx1">
                     <a:lumMod val="75000"/>
@@ -12928,7 +12928,7 @@
                   </a:schemeClr>
                 </a:solidFill>
               </a:rPr>
-              <a:t>│            └── tree.html</a:t>
+              <a:t>├── sorting/</a:t>
             </a:r>
           </a:p>
           <a:p>
@@ -12939,7 +12939,7 @@
               <a:buNone/>
             </a:pPr>
             <a:r>
-              <a:rPr lang="en-US" altLang="zh-TW" sz="1250" dirty="0">
+              <a:rPr lang="en-US" altLang="zh-TW" sz="1100" dirty="0">
                 <a:solidFill>
                   <a:schemeClr val="tx1">
                     <a:lumMod val="75000"/>
@@ -12947,7 +12947,7 @@
                   </a:schemeClr>
                 </a:solidFill>
               </a:rPr>
-              <a:t>├── index.html                               # Main webpage</a:t>
+              <a:t>│            └── index.html</a:t>
             </a:r>
           </a:p>
           <a:p>
@@ -12958,7 +12958,7 @@
               <a:buNone/>
             </a:pPr>
             <a:r>
-              <a:rPr lang="en-US" altLang="zh-TW" sz="1250" dirty="0">
+              <a:rPr lang="en-US" altLang="zh-TW" sz="1100" dirty="0">
                 <a:solidFill>
                   <a:schemeClr val="tx1">
                     <a:lumMod val="75000"/>
@@ -12966,6 +12966,63 @@
                   </a:schemeClr>
                 </a:solidFill>
               </a:rPr>
+              <a:t>├── tree/</a:t>
+            </a:r>
+          </a:p>
+          <a:p>
+            <a:pPr marL="0" indent="0">
+              <a:lnSpc>
+                <a:spcPts val="0"/>
+              </a:lnSpc>
+              <a:buNone/>
+            </a:pPr>
+            <a:r>
+              <a:rPr lang="en-US" altLang="zh-TW" sz="1100" dirty="0">
+                <a:solidFill>
+                  <a:schemeClr val="tx1">
+                    <a:lumMod val="75000"/>
+                    <a:lumOff val="25000"/>
+                  </a:schemeClr>
+                </a:solidFill>
+              </a:rPr>
+              <a:t>│            └── index.html</a:t>
+            </a:r>
+          </a:p>
+          <a:p>
+            <a:pPr marL="0" indent="0">
+              <a:lnSpc>
+                <a:spcPts val="0"/>
+              </a:lnSpc>
+              <a:buNone/>
+            </a:pPr>
+            <a:r>
+              <a:rPr lang="en-US" altLang="zh-TW" sz="1100" dirty="0">
+                <a:solidFill>
+                  <a:schemeClr val="tx1">
+                    <a:lumMod val="75000"/>
+                    <a:lumOff val="25000"/>
+                  </a:schemeClr>
+                </a:solidFill>
+              </a:rPr>
+              <a:t>├── index.html                               # Main webpage</a:t>
+            </a:r>
+          </a:p>
+          <a:p>
+            <a:pPr marL="0" indent="0">
+              <a:lnSpc>
+                <a:spcPts val="0"/>
+              </a:lnSpc>
+              <a:buNone/>
+            </a:pPr>
+            <a:r>
+              <a:rPr lang="en-US" altLang="zh-TW" sz="1100" dirty="0">
+                <a:solidFill>
+                  <a:schemeClr val="tx1">
+                    <a:lumMod val="75000"/>
+                    <a:lumOff val="25000"/>
+                  </a:schemeClr>
+                </a:solidFill>
+              </a:rPr>
               <a:t>├── LICENSE                                   # MIT license</a:t>
             </a:r>
           </a:p>
@@ -12977,7 +13034,7 @@
               <a:buNone/>
             </a:pPr>
             <a:r>
-              <a:rPr lang="en-US" altLang="zh-TW" sz="1250" dirty="0">
+              <a:rPr lang="en-US" altLang="zh-TW" sz="1100" dirty="0">
                 <a:solidFill>
                   <a:schemeClr val="tx1">
                     <a:lumMod val="75000"/>

</xml_diff>

<commit_message>
change structure in the PPt
</commit_message>
<xml_diff>
--- a/Data Structure Visualization.pptx
+++ b/Data Structure Visualization.pptx
@@ -122,12 +122,12 @@
   <p:extLst>
     <p:ext uri="{EFAFB233-063F-42B5-8137-9DF3F51BA10A}">
       <p15:sldGuideLst xmlns:p15="http://schemas.microsoft.com/office/powerpoint/2012/main">
-        <p15:guide id="2" pos="2904" userDrawn="1">
+        <p15:guide id="2" pos="2880" userDrawn="1">
           <p15:clr>
             <a:srgbClr val="A4A3A4"/>
           </p15:clr>
         </p15:guide>
-        <p15:guide id="3" orient="horz" pos="3840" userDrawn="1">
+        <p15:guide id="3" orient="horz" pos="480" userDrawn="1">
           <p15:clr>
             <a:srgbClr val="A4A3A4"/>
           </p15:clr>
@@ -12015,8 +12015,8 @@
         </p:nvSpPr>
         <p:spPr>
           <a:xfrm>
-            <a:off x="4474729" y="549079"/>
-            <a:ext cx="4290580" cy="5867689"/>
+            <a:off x="4441712" y="271989"/>
+            <a:ext cx="5038726" cy="6442848"/>
           </a:xfrm>
           <a:prstGeom prst="rect">
             <a:avLst/>
@@ -12986,6 +12986,44 @@
                 </a:solidFill>
               </a:rPr>
               <a:t>│            └── index.html</a:t>
+            </a:r>
+          </a:p>
+          <a:p>
+            <a:pPr marL="0" indent="0">
+              <a:lnSpc>
+                <a:spcPts val="0"/>
+              </a:lnSpc>
+              <a:buNone/>
+            </a:pPr>
+            <a:r>
+              <a:rPr lang="en-US" altLang="zh-TW" sz="1100" dirty="0">
+                <a:solidFill>
+                  <a:schemeClr val="tx1">
+                    <a:lumMod val="75000"/>
+                    <a:lumOff val="25000"/>
+                  </a:schemeClr>
+                </a:solidFill>
+              </a:rPr>
+              <a:t>├── Data Structure Visualization.pptx         # Visualization slides</a:t>
+            </a:r>
+          </a:p>
+          <a:p>
+            <a:pPr marL="0" indent="0">
+              <a:lnSpc>
+                <a:spcPts val="0"/>
+              </a:lnSpc>
+              <a:buNone/>
+            </a:pPr>
+            <a:r>
+              <a:rPr lang="en-US" altLang="zh-TW" sz="1100" dirty="0">
+                <a:solidFill>
+                  <a:schemeClr val="tx1">
+                    <a:lumMod val="75000"/>
+                    <a:lumOff val="25000"/>
+                  </a:schemeClr>
+                </a:solidFill>
+              </a:rPr>
+              <a:t>├── favicon.ico                               # Website favicon</a:t>
             </a:r>
           </a:p>
           <a:p>
@@ -13099,7 +13137,7 @@
         </p:nvSpPr>
         <p:spPr>
           <a:xfrm>
-            <a:off x="8448245" y="2406361"/>
+            <a:off x="8429773" y="2378653"/>
             <a:ext cx="3214688" cy="1981201"/>
           </a:xfrm>
           <a:prstGeom prst="rect">

</xml_diff>

<commit_message>
change structure in PPT
</commit_message>
<xml_diff>
--- a/Data Structure Visualization.pptx
+++ b/Data Structure Visualization.pptx
@@ -376,7 +376,7 @@
           <a:p>
             <a:fld id="{CE137251-7695-47FE-A246-603BCB21AF0C}" type="datetimeFigureOut">
               <a:rPr lang="zh-TW" altLang="en-US" smtClean="0"/>
-              <a:t>2025/12/19</a:t>
+              <a:t>2025/12/21</a:t>
             </a:fld>
             <a:endParaRPr lang="zh-TW" altLang="en-US"/>
           </a:p>
@@ -546,7 +546,7 @@
           <a:p>
             <a:fld id="{CE137251-7695-47FE-A246-603BCB21AF0C}" type="datetimeFigureOut">
               <a:rPr lang="zh-TW" altLang="en-US" smtClean="0"/>
-              <a:t>2025/12/19</a:t>
+              <a:t>2025/12/21</a:t>
             </a:fld>
             <a:endParaRPr lang="zh-TW" altLang="en-US"/>
           </a:p>
@@ -726,7 +726,7 @@
           <a:p>
             <a:fld id="{CE137251-7695-47FE-A246-603BCB21AF0C}" type="datetimeFigureOut">
               <a:rPr lang="zh-TW" altLang="en-US" smtClean="0"/>
-              <a:t>2025/12/19</a:t>
+              <a:t>2025/12/21</a:t>
             </a:fld>
             <a:endParaRPr lang="zh-TW" altLang="en-US"/>
           </a:p>
@@ -896,7 +896,7 @@
           <a:p>
             <a:fld id="{CE137251-7695-47FE-A246-603BCB21AF0C}" type="datetimeFigureOut">
               <a:rPr lang="zh-TW" altLang="en-US" smtClean="0"/>
-              <a:t>2025/12/19</a:t>
+              <a:t>2025/12/21</a:t>
             </a:fld>
             <a:endParaRPr lang="zh-TW" altLang="en-US"/>
           </a:p>
@@ -1154,7 +1154,7 @@
           <a:p>
             <a:fld id="{CE137251-7695-47FE-A246-603BCB21AF0C}" type="datetimeFigureOut">
               <a:rPr lang="zh-TW" altLang="en-US" smtClean="0"/>
-              <a:t>2025/12/19</a:t>
+              <a:t>2025/12/21</a:t>
             </a:fld>
             <a:endParaRPr lang="zh-TW" altLang="en-US"/>
           </a:p>
@@ -1442,7 +1442,7 @@
           <a:p>
             <a:fld id="{CE137251-7695-47FE-A246-603BCB21AF0C}" type="datetimeFigureOut">
               <a:rPr lang="zh-TW" altLang="en-US" smtClean="0"/>
-              <a:t>2025/12/19</a:t>
+              <a:t>2025/12/21</a:t>
             </a:fld>
             <a:endParaRPr lang="zh-TW" altLang="en-US"/>
           </a:p>
@@ -1884,7 +1884,7 @@
           <a:p>
             <a:fld id="{CE137251-7695-47FE-A246-603BCB21AF0C}" type="datetimeFigureOut">
               <a:rPr lang="zh-TW" altLang="en-US" smtClean="0"/>
-              <a:t>2025/12/19</a:t>
+              <a:t>2025/12/21</a:t>
             </a:fld>
             <a:endParaRPr lang="zh-TW" altLang="en-US"/>
           </a:p>
@@ -2002,7 +2002,7 @@
           <a:p>
             <a:fld id="{CE137251-7695-47FE-A246-603BCB21AF0C}" type="datetimeFigureOut">
               <a:rPr lang="zh-TW" altLang="en-US" smtClean="0"/>
-              <a:t>2025/12/19</a:t>
+              <a:t>2025/12/21</a:t>
             </a:fld>
             <a:endParaRPr lang="zh-TW" altLang="en-US"/>
           </a:p>
@@ -2097,7 +2097,7 @@
           <a:p>
             <a:fld id="{CE137251-7695-47FE-A246-603BCB21AF0C}" type="datetimeFigureOut">
               <a:rPr lang="zh-TW" altLang="en-US" smtClean="0"/>
-              <a:t>2025/12/19</a:t>
+              <a:t>2025/12/21</a:t>
             </a:fld>
             <a:endParaRPr lang="zh-TW" altLang="en-US"/>
           </a:p>
@@ -2385,7 +2385,7 @@
           <a:p>
             <a:fld id="{CE137251-7695-47FE-A246-603BCB21AF0C}" type="datetimeFigureOut">
               <a:rPr lang="zh-TW" altLang="en-US" smtClean="0"/>
-              <a:t>2025/12/19</a:t>
+              <a:t>2025/12/21</a:t>
             </a:fld>
             <a:endParaRPr lang="zh-TW" altLang="en-US"/>
           </a:p>
@@ -2658,7 +2658,7 @@
           <a:p>
             <a:fld id="{CE137251-7695-47FE-A246-603BCB21AF0C}" type="datetimeFigureOut">
               <a:rPr lang="zh-TW" altLang="en-US" smtClean="0"/>
-              <a:t>2025/12/19</a:t>
+              <a:t>2025/12/21</a:t>
             </a:fld>
             <a:endParaRPr lang="zh-TW" altLang="en-US"/>
           </a:p>
@@ -2969,7 +2969,7 @@
           <a:p>
             <a:fld id="{CE137251-7695-47FE-A246-603BCB21AF0C}" type="datetimeFigureOut">
               <a:rPr lang="zh-TW" altLang="en-US" smtClean="0"/>
-              <a:t>2025/12/19</a:t>
+              <a:t>2025/12/21</a:t>
             </a:fld>
             <a:endParaRPr lang="zh-TW" altLang="en-US"/>
           </a:p>
@@ -12015,8 +12015,8 @@
         </p:nvSpPr>
         <p:spPr>
           <a:xfrm>
-            <a:off x="4441712" y="271989"/>
-            <a:ext cx="5038726" cy="6442848"/>
+            <a:off x="4439978" y="214839"/>
+            <a:ext cx="5942272" cy="6442848"/>
           </a:xfrm>
           <a:prstGeom prst="rect">
             <a:avLst/>
@@ -12431,7 +12431,7 @@
                   </a:schemeClr>
                 </a:solidFill>
               </a:rPr>
-              <a:t>│            │        └── showcase.gif                   # Demonstration gif</a:t>
+              <a:t>│            │        └── showcase.gif                                         # Demonstration gif</a:t>
             </a:r>
           </a:p>
           <a:p>
@@ -12833,7 +12833,7 @@
                   </a:schemeClr>
                 </a:solidFill>
               </a:rPr>
-              <a:t>│                                                       └── p5.min.js          # p5.js library</a:t>
+              <a:t>│                                                       └── p5.min.js                 # p5.js library</a:t>
             </a:r>
           </a:p>
           <a:p>
@@ -13004,7 +13004,7 @@
                   </a:schemeClr>
                 </a:solidFill>
               </a:rPr>
-              <a:t>├── Data Structure Visualization.pptx         # Visualization slides</a:t>
+              <a:t>├── Data Structure Visualization.pptx                           # Visualization slides</a:t>
             </a:r>
           </a:p>
           <a:p>
@@ -13023,7 +13023,7 @@
                   </a:schemeClr>
                 </a:solidFill>
               </a:rPr>
-              <a:t>├── favicon.ico                               # Website favicon</a:t>
+              <a:t>├── favicon.ico                                                                        # Website favicon</a:t>
             </a:r>
           </a:p>
           <a:p>
@@ -13042,7 +13042,7 @@
                   </a:schemeClr>
                 </a:solidFill>
               </a:rPr>
-              <a:t>├── index.html                               # Main webpage</a:t>
+              <a:t>├── index.html                                                                        # Main webpage</a:t>
             </a:r>
           </a:p>
           <a:p>
@@ -13061,7 +13061,7 @@
                   </a:schemeClr>
                 </a:solidFill>
               </a:rPr>
-              <a:t>├── LICENSE                                   # MIT license</a:t>
+              <a:t>├── LICENSE                                                                            # MIT license</a:t>
             </a:r>
           </a:p>
           <a:p>
@@ -13080,7 +13080,26 @@
                   </a:schemeClr>
                 </a:solidFill>
               </a:rPr>
-              <a:t>└── README.md                          # Project documentation</a:t>
+              <a:t>├── README.md                                                                   # Project documentation</a:t>
+            </a:r>
+          </a:p>
+          <a:p>
+            <a:pPr marL="0" indent="0">
+              <a:lnSpc>
+                <a:spcPts val="0"/>
+              </a:lnSpc>
+              <a:buNone/>
+            </a:pPr>
+            <a:r>
+              <a:rPr lang="en-US" altLang="zh-TW" sz="1100" dirty="0">
+                <a:solidFill>
+                  <a:schemeClr val="tx1">
+                    <a:lumMod val="75000"/>
+                    <a:lumOff val="25000"/>
+                  </a:schemeClr>
+                </a:solidFill>
+              </a:rPr>
+              <a:t>└── THIRD_PARTY_NOTICES                                          # Third-party license notices</a:t>
             </a:r>
           </a:p>
         </p:txBody>
@@ -13137,7 +13156,7 @@
         </p:nvSpPr>
         <p:spPr>
           <a:xfrm>
-            <a:off x="8429773" y="2378653"/>
+            <a:off x="8174911" y="1853840"/>
             <a:ext cx="3214688" cy="1981201"/>
           </a:xfrm>
           <a:prstGeom prst="rect">

</xml_diff>